<commit_message>
update block diagram with sim_live
</commit_message>
<xml_diff>
--- a/lab/lab2/ECE383_Lab2_Block_Diagram.pptx
+++ b/lab/lab2/ECE383_Lab2_Block_Diagram.pptx
@@ -107,6 +107,22 @@
       </a:defRPr>
     </a:lvl9pPr>
   </p:defaultTextStyle>
+  <p:extLst>
+    <p:ext uri="{EFAFB233-063F-42B5-8137-9DF3F51BA10A}">
+      <p15:sldGuideLst xmlns:p15="http://schemas.microsoft.com/office/powerpoint/2012/main">
+        <p15:guide id="1" orient="horz" pos="4320">
+          <p15:clr>
+            <a:srgbClr val="A4A3A4"/>
+          </p15:clr>
+        </p15:guide>
+        <p15:guide id="2" pos="5760">
+          <p15:clr>
+            <a:srgbClr val="A4A3A4"/>
+          </p15:clr>
+        </p15:guide>
+      </p15:sldGuideLst>
+    </p:ext>
+  </p:extLst>
 </p:presentation>
 </file>
 
@@ -192,7 +208,7 @@
           <a:p>
             <a:fld id="{8F2FD15C-CBA0-4BCE-BE84-26287205EF6C}" type="datetimeFigureOut">
               <a:rPr lang="en-US" smtClean="0"/>
-              <a:t>2/8/2017</a:t>
+              <a:t>3/10/2020</a:t>
             </a:fld>
             <a:endParaRPr lang="en-US"/>
           </a:p>
@@ -726,7 +742,7 @@
             <a:fld id="{1D8BD707-D9CF-40AE-B4C6-C98DA3205C09}" type="datetimeFigureOut">
               <a:rPr lang="en-US" smtClean="0"/>
               <a:pPr/>
-              <a:t>2/8/2017</a:t>
+              <a:t>3/10/2020</a:t>
             </a:fld>
             <a:endParaRPr lang="en-US"/>
           </a:p>
@@ -893,7 +909,7 @@
             <a:fld id="{1D8BD707-D9CF-40AE-B4C6-C98DA3205C09}" type="datetimeFigureOut">
               <a:rPr lang="en-US" smtClean="0"/>
               <a:pPr/>
-              <a:t>2/8/2017</a:t>
+              <a:t>3/10/2020</a:t>
             </a:fld>
             <a:endParaRPr lang="en-US"/>
           </a:p>
@@ -1070,7 +1086,7 @@
             <a:fld id="{1D8BD707-D9CF-40AE-B4C6-C98DA3205C09}" type="datetimeFigureOut">
               <a:rPr lang="en-US" smtClean="0"/>
               <a:pPr/>
-              <a:t>2/8/2017</a:t>
+              <a:t>3/10/2020</a:t>
             </a:fld>
             <a:endParaRPr lang="en-US"/>
           </a:p>
@@ -1237,7 +1253,7 @@
             <a:fld id="{1D8BD707-D9CF-40AE-B4C6-C98DA3205C09}" type="datetimeFigureOut">
               <a:rPr lang="en-US" smtClean="0"/>
               <a:pPr/>
-              <a:t>2/8/2017</a:t>
+              <a:t>3/10/2020</a:t>
             </a:fld>
             <a:endParaRPr lang="en-US"/>
           </a:p>
@@ -1480,7 +1496,7 @@
             <a:fld id="{1D8BD707-D9CF-40AE-B4C6-C98DA3205C09}" type="datetimeFigureOut">
               <a:rPr lang="en-US" smtClean="0"/>
               <a:pPr/>
-              <a:t>2/8/2017</a:t>
+              <a:t>3/10/2020</a:t>
             </a:fld>
             <a:endParaRPr lang="en-US"/>
           </a:p>
@@ -1765,7 +1781,7 @@
             <a:fld id="{1D8BD707-D9CF-40AE-B4C6-C98DA3205C09}" type="datetimeFigureOut">
               <a:rPr lang="en-US" smtClean="0"/>
               <a:pPr/>
-              <a:t>2/8/2017</a:t>
+              <a:t>3/10/2020</a:t>
             </a:fld>
             <a:endParaRPr lang="en-US"/>
           </a:p>
@@ -2184,7 +2200,7 @@
             <a:fld id="{1D8BD707-D9CF-40AE-B4C6-C98DA3205C09}" type="datetimeFigureOut">
               <a:rPr lang="en-US" smtClean="0"/>
               <a:pPr/>
-              <a:t>2/8/2017</a:t>
+              <a:t>3/10/2020</a:t>
             </a:fld>
             <a:endParaRPr lang="en-US"/>
           </a:p>
@@ -2299,7 +2315,7 @@
             <a:fld id="{1D8BD707-D9CF-40AE-B4C6-C98DA3205C09}" type="datetimeFigureOut">
               <a:rPr lang="en-US" smtClean="0"/>
               <a:pPr/>
-              <a:t>2/8/2017</a:t>
+              <a:t>3/10/2020</a:t>
             </a:fld>
             <a:endParaRPr lang="en-US"/>
           </a:p>
@@ -2391,7 +2407,7 @@
             <a:fld id="{1D8BD707-D9CF-40AE-B4C6-C98DA3205C09}" type="datetimeFigureOut">
               <a:rPr lang="en-US" smtClean="0"/>
               <a:pPr/>
-              <a:t>2/8/2017</a:t>
+              <a:t>3/10/2020</a:t>
             </a:fld>
             <a:endParaRPr lang="en-US"/>
           </a:p>
@@ -2665,7 +2681,7 @@
             <a:fld id="{1D8BD707-D9CF-40AE-B4C6-C98DA3205C09}" type="datetimeFigureOut">
               <a:rPr lang="en-US" smtClean="0"/>
               <a:pPr/>
-              <a:t>2/8/2017</a:t>
+              <a:t>3/10/2020</a:t>
             </a:fld>
             <a:endParaRPr lang="en-US"/>
           </a:p>
@@ -2915,7 +2931,7 @@
             <a:fld id="{1D8BD707-D9CF-40AE-B4C6-C98DA3205C09}" type="datetimeFigureOut">
               <a:rPr lang="en-US" smtClean="0"/>
               <a:pPr/>
-              <a:t>2/8/2017</a:t>
+              <a:t>3/10/2020</a:t>
             </a:fld>
             <a:endParaRPr lang="en-US"/>
           </a:p>
@@ -3125,7 +3141,7 @@
             <a:fld id="{1D8BD707-D9CF-40AE-B4C6-C98DA3205C09}" type="datetimeFigureOut">
               <a:rPr lang="en-US" smtClean="0"/>
               <a:pPr/>
-              <a:t>2/8/2017</a:t>
+              <a:t>3/10/2020</a:t>
             </a:fld>
             <a:endParaRPr lang="en-US"/>
           </a:p>
@@ -6883,15 +6899,12 @@
       <p:cxnSp>
         <p:nvCxnSpPr>
           <p:cNvPr id="157" name="Straight Connector 156"/>
-          <p:cNvCxnSpPr>
-            <a:stCxn id="158" idx="3"/>
-            <a:endCxn id="159" idx="1"/>
-          </p:cNvCxnSpPr>
+          <p:cNvCxnSpPr/>
           <p:nvPr/>
         </p:nvCxnSpPr>
         <p:spPr>
           <a:xfrm>
-            <a:off x="4328930" y="4710686"/>
+            <a:off x="4312884" y="4676038"/>
             <a:ext cx="482693" cy="0"/>
           </a:xfrm>
           <a:prstGeom prst="line">
@@ -6927,7 +6940,7 @@
         </p:nvSpPr>
         <p:spPr>
           <a:xfrm>
-            <a:off x="3533670" y="4526020"/>
+            <a:off x="3506283" y="4486552"/>
             <a:ext cx="795260" cy="369332"/>
           </a:xfrm>
           <a:prstGeom prst="rect">
@@ -6958,7 +6971,7 @@
         </p:nvSpPr>
         <p:spPr>
           <a:xfrm>
-            <a:off x="4811623" y="4526020"/>
+            <a:off x="4974056" y="4486552"/>
             <a:ext cx="533400" cy="369332"/>
           </a:xfrm>
           <a:prstGeom prst="rect">
@@ -11116,6 +11129,37 @@
       </p:sp>
       <p:sp>
         <p:nvSpPr>
+          <p:cNvPr id="430" name="TextBox 429"/>
+          <p:cNvSpPr txBox="1"/>
+          <p:nvPr/>
+        </p:nvSpPr>
+        <p:spPr>
+          <a:xfrm>
+            <a:off x="7691850" y="4731956"/>
+            <a:ext cx="658657" cy="369332"/>
+          </a:xfrm>
+          <a:prstGeom prst="rect">
+            <a:avLst/>
+          </a:prstGeom>
+          <a:noFill/>
+        </p:spPr>
+        <p:txBody>
+          <a:bodyPr wrap="square" lIns="91440" tIns="45720" rIns="91440" bIns="45720" rtlCol="0">
+            <a:spAutoFit/>
+          </a:bodyPr>
+          <a:lstStyle/>
+          <a:p>
+            <a:pPr algn="ctr"/>
+            <a:r>
+              <a:rPr lang="en-US" sz="1800" dirty="0" err="1" smtClean="0"/>
+              <a:t>clk</a:t>
+            </a:r>
+            <a:endParaRPr lang="en-US" sz="1800" dirty="0"/>
+          </a:p>
+        </p:txBody>
+      </p:sp>
+      <p:sp>
+        <p:nvSpPr>
           <p:cNvPr id="433" name="TextBox 432"/>
           <p:cNvSpPr txBox="1"/>
           <p:nvPr/>
@@ -11895,8 +11939,8 @@
         </p:nvSpPr>
         <p:spPr>
           <a:xfrm>
-            <a:off x="13427827" y="4848971"/>
-            <a:ext cx="795260" cy="369332"/>
+            <a:off x="12819888" y="4848971"/>
+            <a:ext cx="1403199" cy="369332"/>
           </a:xfrm>
           <a:prstGeom prst="rect">
             <a:avLst/>
@@ -11912,7 +11956,15 @@
             <a:pPr algn="r"/>
             <a:r>
               <a:rPr lang="en-US" sz="1800" dirty="0" smtClean="0"/>
-              <a:t>ch2</a:t>
+              <a:t>ch2 </a:t>
+            </a:r>
+            <a:r>
+              <a:rPr lang="en-US" sz="1800" dirty="0"/>
+              <a:t>(switch</a:t>
+            </a:r>
+            <a:r>
+              <a:rPr lang="en-US" sz="1800" dirty="0" smtClean="0"/>
+              <a:t>)</a:t>
             </a:r>
             <a:endParaRPr lang="en-US" sz="1800" dirty="0"/>
           </a:p>
@@ -11995,8 +12047,8 @@
         </p:nvSpPr>
         <p:spPr>
           <a:xfrm>
-            <a:off x="13436600" y="4516914"/>
-            <a:ext cx="795260" cy="369332"/>
+            <a:off x="12820522" y="4516914"/>
+            <a:ext cx="1411338" cy="369332"/>
           </a:xfrm>
           <a:prstGeom prst="rect">
             <a:avLst/>
@@ -12011,8 +12063,12 @@
           <a:p>
             <a:pPr algn="r"/>
             <a:r>
+              <a:rPr lang="en-US" sz="1800" dirty="0"/>
+              <a:t>c</a:t>
+            </a:r>
+            <a:r>
               <a:rPr lang="en-US" sz="1800" dirty="0" smtClean="0"/>
-              <a:t>ch1</a:t>
+              <a:t>h1 (switch)</a:t>
             </a:r>
             <a:endParaRPr lang="en-US" sz="1800" dirty="0"/>
           </a:p>
@@ -13409,8 +13465,8 @@
         </p:nvCxnSpPr>
         <p:spPr>
           <a:xfrm>
-            <a:off x="10154887" y="1443514"/>
-            <a:ext cx="0" cy="635162"/>
+            <a:off x="10254975" y="1739433"/>
+            <a:ext cx="3646" cy="349029"/>
           </a:xfrm>
           <a:prstGeom prst="line">
             <a:avLst/>
@@ -13445,8 +13501,8 @@
         </p:nvSpPr>
         <p:spPr>
           <a:xfrm>
-            <a:off x="9712078" y="1074182"/>
-            <a:ext cx="885618" cy="369332"/>
+            <a:off x="9777782" y="1093102"/>
+            <a:ext cx="954386" cy="646331"/>
           </a:xfrm>
           <a:prstGeom prst="rect">
             <a:avLst/>
@@ -13463,6 +13519,10 @@
             <a:r>
               <a:rPr lang="en-US" sz="1800" dirty="0" err="1" smtClean="0"/>
               <a:t>exSel</a:t>
+            </a:r>
+            <a:r>
+              <a:rPr lang="en-US" sz="1800" dirty="0" smtClean="0"/>
+              <a:t> (switch)</a:t>
             </a:r>
             <a:endParaRPr lang="en-US" sz="1800" dirty="0"/>
           </a:p>
@@ -14165,6 +14225,345 @@
             <a:r>
               <a:rPr lang="en-US" sz="1800" dirty="0" err="1"/>
               <a:t>reset_n</a:t>
+            </a:r>
+            <a:endParaRPr lang="en-US" sz="1800" dirty="0"/>
+          </a:p>
+        </p:txBody>
+      </p:sp>
+      <p:sp>
+        <p:nvSpPr>
+          <p:cNvPr id="314" name="TextBox 313"/>
+          <p:cNvSpPr txBox="1"/>
+          <p:nvPr/>
+        </p:nvSpPr>
+        <p:spPr>
+          <a:xfrm>
+            <a:off x="12242577" y="9498816"/>
+            <a:ext cx="1572174" cy="369332"/>
+          </a:xfrm>
+          <a:prstGeom prst="rect">
+            <a:avLst/>
+          </a:prstGeom>
+          <a:noFill/>
+        </p:spPr>
+        <p:txBody>
+          <a:bodyPr wrap="square" lIns="91440" tIns="45720" rIns="91440" bIns="45720" rtlCol="0">
+            <a:spAutoFit/>
+          </a:bodyPr>
+          <a:lstStyle/>
+          <a:p>
+            <a:pPr algn="ctr"/>
+            <a:r>
+              <a:rPr lang="en-US" sz="1800" dirty="0" err="1" smtClean="0"/>
+              <a:t>tr_time</a:t>
+            </a:r>
+            <a:endParaRPr lang="en-US" sz="1800" dirty="0"/>
+          </a:p>
+        </p:txBody>
+      </p:sp>
+      <p:sp>
+        <p:nvSpPr>
+          <p:cNvPr id="315" name="TextBox 314"/>
+          <p:cNvSpPr txBox="1"/>
+          <p:nvPr/>
+        </p:nvSpPr>
+        <p:spPr>
+          <a:xfrm>
+            <a:off x="11226085" y="9514685"/>
+            <a:ext cx="1416662" cy="369332"/>
+          </a:xfrm>
+          <a:prstGeom prst="rect">
+            <a:avLst/>
+          </a:prstGeom>
+          <a:noFill/>
+        </p:spPr>
+        <p:txBody>
+          <a:bodyPr wrap="square" lIns="91440" tIns="45720" rIns="91440" bIns="45720" rtlCol="0">
+            <a:spAutoFit/>
+          </a:bodyPr>
+          <a:lstStyle/>
+          <a:p>
+            <a:pPr algn="ctr"/>
+            <a:r>
+              <a:rPr lang="en-US" sz="1800" dirty="0" err="1" smtClean="0"/>
+              <a:t>tr_volt</a:t>
+            </a:r>
+            <a:endParaRPr lang="en-US" sz="1800" dirty="0"/>
+          </a:p>
+        </p:txBody>
+      </p:sp>
+      <p:cxnSp>
+        <p:nvCxnSpPr>
+          <p:cNvPr id="316" name="Straight Connector 315"/>
+          <p:cNvCxnSpPr/>
+          <p:nvPr/>
+        </p:nvCxnSpPr>
+        <p:spPr>
+          <a:xfrm>
+            <a:off x="11934415" y="9884017"/>
+            <a:ext cx="0" cy="1219201"/>
+          </a:xfrm>
+          <a:prstGeom prst="line">
+            <a:avLst/>
+          </a:prstGeom>
+          <a:ln w="38100">
+            <a:solidFill>
+              <a:schemeClr val="tx1"/>
+            </a:solidFill>
+            <a:tailEnd type="triangle"/>
+          </a:ln>
+        </p:spPr>
+        <p:style>
+          <a:lnRef idx="1">
+            <a:schemeClr val="accent1"/>
+          </a:lnRef>
+          <a:fillRef idx="0">
+            <a:schemeClr val="accent1"/>
+          </a:fillRef>
+          <a:effectRef idx="0">
+            <a:schemeClr val="accent1"/>
+          </a:effectRef>
+          <a:fontRef idx="minor">
+            <a:schemeClr val="tx1"/>
+          </a:fontRef>
+        </p:style>
+      </p:cxnSp>
+      <p:cxnSp>
+        <p:nvCxnSpPr>
+          <p:cNvPr id="317" name="Straight Connector 316"/>
+          <p:cNvCxnSpPr/>
+          <p:nvPr/>
+        </p:nvCxnSpPr>
+        <p:spPr>
+          <a:xfrm>
+            <a:off x="13028664" y="9884018"/>
+            <a:ext cx="0" cy="1219200"/>
+          </a:xfrm>
+          <a:prstGeom prst="line">
+            <a:avLst/>
+          </a:prstGeom>
+          <a:ln w="38100">
+            <a:solidFill>
+              <a:schemeClr val="tx1"/>
+            </a:solidFill>
+            <a:headEnd type="none"/>
+            <a:tailEnd type="triangle"/>
+          </a:ln>
+        </p:spPr>
+        <p:style>
+          <a:lnRef idx="1">
+            <a:schemeClr val="accent1"/>
+          </a:lnRef>
+          <a:fillRef idx="0">
+            <a:schemeClr val="accent1"/>
+          </a:fillRef>
+          <a:effectRef idx="0">
+            <a:schemeClr val="accent1"/>
+          </a:effectRef>
+          <a:fontRef idx="minor">
+            <a:schemeClr val="tx1"/>
+          </a:fontRef>
+        </p:style>
+      </p:cxnSp>
+      <p:sp>
+        <p:nvSpPr>
+          <p:cNvPr id="378" name="TextBox 377"/>
+          <p:cNvSpPr txBox="1"/>
+          <p:nvPr/>
+        </p:nvSpPr>
+        <p:spPr>
+          <a:xfrm>
+            <a:off x="12308953" y="11156961"/>
+            <a:ext cx="1407047" cy="369332"/>
+          </a:xfrm>
+          <a:prstGeom prst="rect">
+            <a:avLst/>
+          </a:prstGeom>
+          <a:noFill/>
+        </p:spPr>
+        <p:txBody>
+          <a:bodyPr wrap="square" lIns="91440" tIns="45720" rIns="91440" bIns="45720" rtlCol="0">
+            <a:spAutoFit/>
+          </a:bodyPr>
+          <a:lstStyle/>
+          <a:p>
+            <a:pPr algn="ctr"/>
+            <a:r>
+              <a:rPr lang="en-US" sz="1800" dirty="0" err="1"/>
+              <a:t>tr_time</a:t>
+            </a:r>
+            <a:endParaRPr lang="en-US" sz="1800" dirty="0"/>
+          </a:p>
+        </p:txBody>
+      </p:sp>
+      <p:sp>
+        <p:nvSpPr>
+          <p:cNvPr id="380" name="TextBox 379"/>
+          <p:cNvSpPr txBox="1"/>
+          <p:nvPr/>
+        </p:nvSpPr>
+        <p:spPr>
+          <a:xfrm>
+            <a:off x="11344051" y="11156961"/>
+            <a:ext cx="1202776" cy="646331"/>
+          </a:xfrm>
+          <a:prstGeom prst="rect">
+            <a:avLst/>
+          </a:prstGeom>
+          <a:noFill/>
+        </p:spPr>
+        <p:txBody>
+          <a:bodyPr wrap="square" lIns="91440" tIns="45720" rIns="91440" bIns="45720" rtlCol="0">
+            <a:spAutoFit/>
+          </a:bodyPr>
+          <a:lstStyle/>
+          <a:p>
+            <a:pPr algn="ctr"/>
+            <a:r>
+              <a:rPr lang="en-US" sz="1800" dirty="0" err="1"/>
+              <a:t>tr_volt</a:t>
+            </a:r>
+            <a:endParaRPr lang="en-US" sz="1800" dirty="0"/>
+          </a:p>
+          <a:p>
+            <a:pPr algn="ctr"/>
+            <a:endParaRPr lang="en-US" sz="1800" dirty="0"/>
+          </a:p>
+        </p:txBody>
+      </p:sp>
+      <p:cxnSp>
+        <p:nvCxnSpPr>
+          <p:cNvPr id="381" name="Straight Connector 380"/>
+          <p:cNvCxnSpPr/>
+          <p:nvPr/>
+        </p:nvCxnSpPr>
+        <p:spPr>
+          <a:xfrm flipV="1">
+            <a:off x="11762669" y="10341217"/>
+            <a:ext cx="323623" cy="304800"/>
+          </a:xfrm>
+          <a:prstGeom prst="line">
+            <a:avLst/>
+          </a:prstGeom>
+          <a:ln w="12700">
+            <a:solidFill>
+              <a:schemeClr val="tx1"/>
+            </a:solidFill>
+          </a:ln>
+        </p:spPr>
+        <p:style>
+          <a:lnRef idx="1">
+            <a:schemeClr val="accent1"/>
+          </a:lnRef>
+          <a:fillRef idx="0">
+            <a:schemeClr val="accent1"/>
+          </a:fillRef>
+          <a:effectRef idx="0">
+            <a:schemeClr val="accent1"/>
+          </a:effectRef>
+          <a:fontRef idx="minor">
+            <a:schemeClr val="tx1"/>
+          </a:fontRef>
+        </p:style>
+      </p:cxnSp>
+      <p:cxnSp>
+        <p:nvCxnSpPr>
+          <p:cNvPr id="386" name="Straight Connector 385"/>
+          <p:cNvCxnSpPr/>
+          <p:nvPr/>
+        </p:nvCxnSpPr>
+        <p:spPr>
+          <a:xfrm flipV="1">
+            <a:off x="12866852" y="10385152"/>
+            <a:ext cx="323623" cy="304800"/>
+          </a:xfrm>
+          <a:prstGeom prst="line">
+            <a:avLst/>
+          </a:prstGeom>
+          <a:ln w="12700">
+            <a:solidFill>
+              <a:schemeClr val="tx1"/>
+            </a:solidFill>
+          </a:ln>
+        </p:spPr>
+        <p:style>
+          <a:lnRef idx="1">
+            <a:schemeClr val="accent1"/>
+          </a:lnRef>
+          <a:fillRef idx="0">
+            <a:schemeClr val="accent1"/>
+          </a:fillRef>
+          <a:effectRef idx="0">
+            <a:schemeClr val="accent1"/>
+          </a:effectRef>
+          <a:fontRef idx="minor">
+            <a:schemeClr val="tx1"/>
+          </a:fontRef>
+        </p:style>
+      </p:cxnSp>
+      <p:cxnSp>
+        <p:nvCxnSpPr>
+          <p:cNvPr id="322" name="Straight Connector 321"/>
+          <p:cNvCxnSpPr/>
+          <p:nvPr/>
+        </p:nvCxnSpPr>
+        <p:spPr>
+          <a:xfrm>
+            <a:off x="4318490" y="4312783"/>
+            <a:ext cx="482693" cy="0"/>
+          </a:xfrm>
+          <a:prstGeom prst="line">
+            <a:avLst/>
+          </a:prstGeom>
+          <a:ln w="12700">
+            <a:solidFill>
+              <a:schemeClr val="tx1"/>
+            </a:solidFill>
+            <a:headEnd type="triangle"/>
+            <a:tailEnd type="none"/>
+          </a:ln>
+        </p:spPr>
+        <p:style>
+          <a:lnRef idx="1">
+            <a:schemeClr val="accent1"/>
+          </a:lnRef>
+          <a:fillRef idx="0">
+            <a:schemeClr val="accent1"/>
+          </a:fillRef>
+          <a:effectRef idx="0">
+            <a:schemeClr val="accent1"/>
+          </a:effectRef>
+          <a:fontRef idx="minor">
+            <a:schemeClr val="tx1"/>
+          </a:fontRef>
+        </p:style>
+      </p:cxnSp>
+      <p:sp>
+        <p:nvSpPr>
+          <p:cNvPr id="368" name="TextBox 367"/>
+          <p:cNvSpPr txBox="1"/>
+          <p:nvPr/>
+        </p:nvSpPr>
+        <p:spPr>
+          <a:xfrm>
+            <a:off x="3246310" y="4114058"/>
+            <a:ext cx="1044817" cy="369332"/>
+          </a:xfrm>
+          <a:prstGeom prst="rect">
+            <a:avLst/>
+          </a:prstGeom>
+          <a:noFill/>
+        </p:spPr>
+        <p:txBody>
+          <a:bodyPr wrap="square" lIns="91440" tIns="45720" rIns="91440" bIns="45720" rtlCol="0">
+            <a:spAutoFit/>
+          </a:bodyPr>
+          <a:lstStyle/>
+          <a:p>
+            <a:pPr algn="r"/>
+            <a:r>
+              <a:rPr lang="en-US" sz="1800" dirty="0" err="1" smtClean="0"/>
+              <a:t>sim_live</a:t>
             </a:r>
             <a:endParaRPr lang="en-US" sz="1800" dirty="0"/>
           </a:p>

</xml_diff>